<commit_message>
etwas am ppt geändert
</commit_message>
<xml_diff>
--- a/TeamAssign_part1.pptx
+++ b/TeamAssign_part1.pptx
@@ -110,6 +110,11 @@
       </a:defRPr>
     </a:lvl9pPr>
   </p:defaultTextStyle>
+  <p:extLst>
+    <p:ext uri="{EFAFB233-063F-42B5-8137-9DF3F51BA10A}">
+      <p15:sldGuideLst xmlns:p15="http://schemas.microsoft.com/office/powerpoint/2012/main"/>
+    </p:ext>
+  </p:extLst>
 </p:presentation>
 </file>
 
@@ -4007,7 +4012,7 @@
           <a:p>
             <a:fld id="{2E1108C5-D6D8-694B-9979-03EFAD528391}" type="datetimeFigureOut">
               <a:rPr lang="de-DE" smtClean="0"/>
-              <a:t>19.05.21</a:t>
+              <a:t>20.05.21</a:t>
             </a:fld>
             <a:endParaRPr lang="de-DE"/>
           </a:p>
@@ -4205,7 +4210,7 @@
           <a:p>
             <a:fld id="{2E1108C5-D6D8-694B-9979-03EFAD528391}" type="datetimeFigureOut">
               <a:rPr lang="de-DE" smtClean="0"/>
-              <a:t>19.05.21</a:t>
+              <a:t>20.05.21</a:t>
             </a:fld>
             <a:endParaRPr lang="de-DE"/>
           </a:p>
@@ -4413,7 +4418,7 @@
           <a:p>
             <a:fld id="{2E1108C5-D6D8-694B-9979-03EFAD528391}" type="datetimeFigureOut">
               <a:rPr lang="de-DE" smtClean="0"/>
-              <a:t>19.05.21</a:t>
+              <a:t>20.05.21</a:t>
             </a:fld>
             <a:endParaRPr lang="de-DE"/>
           </a:p>
@@ -4611,7 +4616,7 @@
           <a:p>
             <a:fld id="{2E1108C5-D6D8-694B-9979-03EFAD528391}" type="datetimeFigureOut">
               <a:rPr lang="de-DE" smtClean="0"/>
-              <a:t>19.05.21</a:t>
+              <a:t>20.05.21</a:t>
             </a:fld>
             <a:endParaRPr lang="de-DE"/>
           </a:p>
@@ -4886,7 +4891,7 @@
           <a:p>
             <a:fld id="{2E1108C5-D6D8-694B-9979-03EFAD528391}" type="datetimeFigureOut">
               <a:rPr lang="de-DE" smtClean="0"/>
-              <a:t>19.05.21</a:t>
+              <a:t>20.05.21</a:t>
             </a:fld>
             <a:endParaRPr lang="de-DE"/>
           </a:p>
@@ -5151,7 +5156,7 @@
           <a:p>
             <a:fld id="{2E1108C5-D6D8-694B-9979-03EFAD528391}" type="datetimeFigureOut">
               <a:rPr lang="de-DE" smtClean="0"/>
-              <a:t>19.05.21</a:t>
+              <a:t>20.05.21</a:t>
             </a:fld>
             <a:endParaRPr lang="de-DE"/>
           </a:p>
@@ -5563,7 +5568,7 @@
           <a:p>
             <a:fld id="{2E1108C5-D6D8-694B-9979-03EFAD528391}" type="datetimeFigureOut">
               <a:rPr lang="de-DE" smtClean="0"/>
-              <a:t>19.05.21</a:t>
+              <a:t>20.05.21</a:t>
             </a:fld>
             <a:endParaRPr lang="de-DE"/>
           </a:p>
@@ -5704,7 +5709,7 @@
           <a:p>
             <a:fld id="{2E1108C5-D6D8-694B-9979-03EFAD528391}" type="datetimeFigureOut">
               <a:rPr lang="de-DE" smtClean="0"/>
-              <a:t>19.05.21</a:t>
+              <a:t>20.05.21</a:t>
             </a:fld>
             <a:endParaRPr lang="de-DE"/>
           </a:p>
@@ -5817,7 +5822,7 @@
           <a:p>
             <a:fld id="{2E1108C5-D6D8-694B-9979-03EFAD528391}" type="datetimeFigureOut">
               <a:rPr lang="de-DE" smtClean="0"/>
-              <a:t>19.05.21</a:t>
+              <a:t>20.05.21</a:t>
             </a:fld>
             <a:endParaRPr lang="de-DE"/>
           </a:p>
@@ -6128,7 +6133,7 @@
           <a:p>
             <a:fld id="{2E1108C5-D6D8-694B-9979-03EFAD528391}" type="datetimeFigureOut">
               <a:rPr lang="de-DE" smtClean="0"/>
-              <a:t>19.05.21</a:t>
+              <a:t>20.05.21</a:t>
             </a:fld>
             <a:endParaRPr lang="de-DE"/>
           </a:p>
@@ -6416,7 +6421,7 @@
           <a:p>
             <a:fld id="{2E1108C5-D6D8-694B-9979-03EFAD528391}" type="datetimeFigureOut">
               <a:rPr lang="de-DE" smtClean="0"/>
-              <a:t>19.05.21</a:t>
+              <a:t>20.05.21</a:t>
             </a:fld>
             <a:endParaRPr lang="de-DE"/>
           </a:p>
@@ -6657,7 +6662,7 @@
           <a:p>
             <a:fld id="{2E1108C5-D6D8-694B-9979-03EFAD528391}" type="datetimeFigureOut">
               <a:rPr lang="de-DE" smtClean="0"/>
-              <a:t>19.05.21</a:t>
+              <a:t>20.05.21</a:t>
             </a:fld>
             <a:endParaRPr lang="de-DE"/>
           </a:p>
@@ -8393,6 +8398,152 @@
               <a:t>?</a:t>
             </a:r>
           </a:p>
+          <a:p>
+            <a:r>
+              <a:rPr lang="de-DE" dirty="0" err="1"/>
+              <a:t>Here</a:t>
+            </a:r>
+            <a:r>
+              <a:rPr lang="de-DE" dirty="0"/>
+              <a:t> </a:t>
+            </a:r>
+            <a:r>
+              <a:rPr lang="de-DE" dirty="0" err="1"/>
+              <a:t>we</a:t>
+            </a:r>
+            <a:r>
+              <a:rPr lang="de-DE" dirty="0"/>
+              <a:t> </a:t>
+            </a:r>
+            <a:r>
+              <a:rPr lang="de-DE" dirty="0" err="1"/>
+              <a:t>have</a:t>
+            </a:r>
+            <a:r>
+              <a:rPr lang="de-DE" dirty="0"/>
+              <a:t> </a:t>
+            </a:r>
+            <a:r>
+              <a:rPr lang="de-DE" dirty="0" err="1"/>
+              <a:t>to</a:t>
+            </a:r>
+            <a:r>
+              <a:rPr lang="de-DE" dirty="0"/>
+              <a:t> </a:t>
+            </a:r>
+            <a:r>
+              <a:rPr lang="de-DE" dirty="0" err="1"/>
+              <a:t>add</a:t>
+            </a:r>
+            <a:r>
+              <a:rPr lang="de-DE" dirty="0"/>
+              <a:t> </a:t>
+            </a:r>
+            <a:r>
+              <a:rPr lang="de-DE" dirty="0" err="1"/>
+              <a:t>more</a:t>
+            </a:r>
+            <a:r>
+              <a:rPr lang="de-DE" dirty="0"/>
+              <a:t> </a:t>
+            </a:r>
+            <a:r>
+              <a:rPr lang="de-DE" dirty="0" err="1"/>
+              <a:t>ideas</a:t>
+            </a:r>
+            <a:r>
+              <a:rPr lang="de-DE" dirty="0"/>
+              <a:t> </a:t>
+            </a:r>
+            <a:r>
+              <a:rPr lang="de-DE" dirty="0" err="1"/>
+              <a:t>for</a:t>
+            </a:r>
+            <a:r>
+              <a:rPr lang="de-DE" dirty="0"/>
+              <a:t> </a:t>
+            </a:r>
+            <a:r>
+              <a:rPr lang="de-DE" dirty="0" err="1"/>
+              <a:t>content</a:t>
+            </a:r>
+            <a:r>
+              <a:rPr lang="de-DE" dirty="0"/>
+              <a:t> </a:t>
+            </a:r>
+            <a:r>
+              <a:rPr lang="de-DE" dirty="0" err="1"/>
+              <a:t>of</a:t>
+            </a:r>
+            <a:r>
+              <a:rPr lang="de-DE" dirty="0"/>
+              <a:t> </a:t>
+            </a:r>
+            <a:r>
+              <a:rPr lang="de-DE" dirty="0" err="1"/>
+              <a:t>the</a:t>
+            </a:r>
+            <a:r>
+              <a:rPr lang="de-DE" dirty="0"/>
+              <a:t> </a:t>
+            </a:r>
+            <a:r>
+              <a:rPr lang="de-DE" dirty="0" err="1"/>
+              <a:t>website</a:t>
+            </a:r>
+            <a:r>
+              <a:rPr lang="de-DE" dirty="0"/>
+              <a:t>, e.g.</a:t>
+            </a:r>
+          </a:p>
+          <a:p>
+            <a:pPr lvl="1"/>
+            <a:r>
+              <a:rPr lang="de-DE" dirty="0"/>
+              <a:t>Ticket </a:t>
+            </a:r>
+            <a:r>
+              <a:rPr lang="de-DE" dirty="0" err="1"/>
+              <a:t>system</a:t>
+            </a:r>
+            <a:endParaRPr lang="de-DE" dirty="0"/>
+          </a:p>
+          <a:p>
+            <a:pPr lvl="1"/>
+            <a:r>
+              <a:rPr lang="de-DE" dirty="0" err="1"/>
+              <a:t>Present</a:t>
+            </a:r>
+            <a:r>
+              <a:rPr lang="de-DE" dirty="0"/>
+              <a:t> 3 </a:t>
+            </a:r>
+            <a:r>
+              <a:rPr lang="de-DE" dirty="0" err="1"/>
+              <a:t>attractions</a:t>
+            </a:r>
+            <a:r>
+              <a:rPr lang="de-DE" dirty="0"/>
+              <a:t>: </a:t>
+            </a:r>
+            <a:r>
+              <a:rPr lang="de-DE" dirty="0" err="1"/>
+              <a:t>roller</a:t>
+            </a:r>
+            <a:r>
+              <a:rPr lang="de-DE" dirty="0"/>
+              <a:t> </a:t>
+            </a:r>
+            <a:r>
+              <a:rPr lang="de-DE" dirty="0" err="1"/>
+              <a:t>coaster</a:t>
+            </a:r>
+            <a:r>
+              <a:rPr lang="de-DE"/>
+              <a:t>,….</a:t>
+            </a:r>
+            <a:endParaRPr lang="de-DE" dirty="0"/>
+          </a:p>
         </p:txBody>
       </p:sp>
     </p:spTree>

</xml_diff>